<commit_message>
Proposta de projecto preparada ficando a faltar calendarização. Necessário verificar todo o texto e fazer alterações no desenvolvimento obrigatório/optativo.
</commit_message>
<xml_diff>
--- a/Proposta de Projecto/Esquemas da Proposta.pptx
+++ b/Proposta de Projecto/Esquemas da Proposta.pptx
@@ -6,6 +6,7 @@
   </p:sldMasterIdLst>
   <p:sldIdLst>
     <p:sldId id="256" r:id="rId2"/>
+    <p:sldId id="257" r:id="rId3"/>
   </p:sldIdLst>
   <p:sldSz cx="9144000" cy="6858000" type="screen4x3"/>
   <p:notesSz cx="6858000" cy="9144000"/>
@@ -1119,6 +1120,13 @@
         </dgm:presLayoutVars>
       </dgm:prSet>
       <dgm:spPr/>
+      <dgm:t>
+        <a:bodyPr/>
+        <a:lstStyle/>
+        <a:p>
+          <a:endParaRPr lang="pt-PT"/>
+        </a:p>
+      </dgm:t>
     </dgm:pt>
     <dgm:pt modelId="{BD85FBF5-5F71-414E-A3E2-C86BB7727420}" type="pres">
       <dgm:prSet presAssocID="{F6D1D9EE-9753-4862-9562-1BE7A7A26C27}" presName="parTxOnlySpace" presStyleCnt="0"/>
@@ -1185,17 +1193,17 @@
     </dgm:pt>
   </dgm:ptLst>
   <dgm:cxnLst>
+    <dgm:cxn modelId="{87A96128-CF8E-4063-B007-56BF43D15A5B}" type="presOf" srcId="{63BDE31C-2784-4184-93F7-43792FB88E83}" destId="{0B2F443D-C37B-42DD-8503-32BF7FE08A55}" srcOrd="0" destOrd="0" presId="urn:microsoft.com/office/officeart/2005/8/layout/chevron1"/>
+    <dgm:cxn modelId="{D1B230A0-D5B1-430E-991D-1926E2144AB9}" type="presOf" srcId="{1B5F0BB8-505B-4802-9841-C509F82F1A25}" destId="{28E0AAF5-507E-4C66-B97C-86E59AE61164}" srcOrd="0" destOrd="0" presId="urn:microsoft.com/office/officeart/2005/8/layout/chevron1"/>
+    <dgm:cxn modelId="{6F307C2D-D037-42A3-B711-0A675ACA5D20}" srcId="{63BDE31C-2784-4184-93F7-43792FB88E83}" destId="{6C91D146-AF8B-472B-9ABF-56071B15FADF}" srcOrd="2" destOrd="0" parTransId="{16F147B8-06E7-492C-95D3-3628AF9A6F41}" sibTransId="{5989CB1C-E668-4BC5-8F84-AECCA4B433B7}"/>
+    <dgm:cxn modelId="{AEE625EA-6543-4C78-9C7C-1910D0CD29F5}" type="presOf" srcId="{CAE1FBBF-E9AF-4660-BC7F-8EBC2398DD97}" destId="{15907870-5DBE-4702-8C88-0A3FA2554873}" srcOrd="0" destOrd="0" presId="urn:microsoft.com/office/officeart/2005/8/layout/chevron1"/>
+    <dgm:cxn modelId="{FADF97CC-F591-4C52-9243-49CCB930F0FA}" type="presOf" srcId="{ED4BEFE7-F486-4F71-84B4-285BD4F2F9E9}" destId="{99687966-4EA3-42CA-A0E2-33A36342ADDD}" srcOrd="0" destOrd="0" presId="urn:microsoft.com/office/officeart/2005/8/layout/chevron1"/>
     <dgm:cxn modelId="{30E044AE-26F1-44F0-957A-9D21B08C80F5}" srcId="{63BDE31C-2784-4184-93F7-43792FB88E83}" destId="{232D84CF-A223-406C-ABCF-5E31AAC5F06F}" srcOrd="0" destOrd="0" parTransId="{8D9D034E-06B2-452B-9936-39E88F04B5B4}" sibTransId="{DFFC398D-7969-46B9-BFBB-341A435D971C}"/>
-    <dgm:cxn modelId="{D1B230A0-D5B1-430E-991D-1926E2144AB9}" type="presOf" srcId="{1B5F0BB8-505B-4802-9841-C509F82F1A25}" destId="{28E0AAF5-507E-4C66-B97C-86E59AE61164}" srcOrd="0" destOrd="0" presId="urn:microsoft.com/office/officeart/2005/8/layout/chevron1"/>
-    <dgm:cxn modelId="{FADF97CC-F591-4C52-9243-49CCB930F0FA}" type="presOf" srcId="{ED4BEFE7-F486-4F71-84B4-285BD4F2F9E9}" destId="{99687966-4EA3-42CA-A0E2-33A36342ADDD}" srcOrd="0" destOrd="0" presId="urn:microsoft.com/office/officeart/2005/8/layout/chevron1"/>
     <dgm:cxn modelId="{81C7392A-10EF-4BFF-90FB-2B49570370F9}" srcId="{63BDE31C-2784-4184-93F7-43792FB88E83}" destId="{1B5F0BB8-505B-4802-9841-C509F82F1A25}" srcOrd="1" destOrd="0" parTransId="{571E2747-226E-47AC-8332-C6665871BBAD}" sibTransId="{F6D1D9EE-9753-4862-9562-1BE7A7A26C27}"/>
-    <dgm:cxn modelId="{87A96128-CF8E-4063-B007-56BF43D15A5B}" type="presOf" srcId="{63BDE31C-2784-4184-93F7-43792FB88E83}" destId="{0B2F443D-C37B-42DD-8503-32BF7FE08A55}" srcOrd="0" destOrd="0" presId="urn:microsoft.com/office/officeart/2005/8/layout/chevron1"/>
+    <dgm:cxn modelId="{CAA2700B-B959-4773-A44D-689CE0C99D5E}" srcId="{63BDE31C-2784-4184-93F7-43792FB88E83}" destId="{ED4BEFE7-F486-4F71-84B4-285BD4F2F9E9}" srcOrd="4" destOrd="0" parTransId="{656EECDB-BD34-486F-B985-4D4C311D85F9}" sibTransId="{BE2F8F78-01BF-41C5-8AB4-B97A9881A995}"/>
     <dgm:cxn modelId="{2EDCB250-AEA9-4675-8F1D-1862E2B18F76}" srcId="{63BDE31C-2784-4184-93F7-43792FB88E83}" destId="{CAE1FBBF-E9AF-4660-BC7F-8EBC2398DD97}" srcOrd="3" destOrd="0" parTransId="{C71BA4A3-D2F3-418B-A766-7FC601CADCAE}" sibTransId="{CA4FD60E-F98D-4BE9-83F4-BEAB14D9ECF9}"/>
-    <dgm:cxn modelId="{AEE625EA-6543-4C78-9C7C-1910D0CD29F5}" type="presOf" srcId="{CAE1FBBF-E9AF-4660-BC7F-8EBC2398DD97}" destId="{15907870-5DBE-4702-8C88-0A3FA2554873}" srcOrd="0" destOrd="0" presId="urn:microsoft.com/office/officeart/2005/8/layout/chevron1"/>
+    <dgm:cxn modelId="{F7BE5357-BB56-45F2-9D23-395488534B1F}" type="presOf" srcId="{6C91D146-AF8B-472B-9ABF-56071B15FADF}" destId="{D83F50BB-0D21-4485-AAB3-10916F710F3A}" srcOrd="0" destOrd="0" presId="urn:microsoft.com/office/officeart/2005/8/layout/chevron1"/>
     <dgm:cxn modelId="{758B4F43-61CC-4DBB-A9D3-129E4993BF01}" type="presOf" srcId="{232D84CF-A223-406C-ABCF-5E31AAC5F06F}" destId="{5C234324-6FA9-46DA-9411-9ED67D810730}" srcOrd="0" destOrd="0" presId="urn:microsoft.com/office/officeart/2005/8/layout/chevron1"/>
-    <dgm:cxn modelId="{6F307C2D-D037-42A3-B711-0A675ACA5D20}" srcId="{63BDE31C-2784-4184-93F7-43792FB88E83}" destId="{6C91D146-AF8B-472B-9ABF-56071B15FADF}" srcOrd="2" destOrd="0" parTransId="{16F147B8-06E7-492C-95D3-3628AF9A6F41}" sibTransId="{5989CB1C-E668-4BC5-8F84-AECCA4B433B7}"/>
-    <dgm:cxn modelId="{CAA2700B-B959-4773-A44D-689CE0C99D5E}" srcId="{63BDE31C-2784-4184-93F7-43792FB88E83}" destId="{ED4BEFE7-F486-4F71-84B4-285BD4F2F9E9}" srcOrd="4" destOrd="0" parTransId="{656EECDB-BD34-486F-B985-4D4C311D85F9}" sibTransId="{BE2F8F78-01BF-41C5-8AB4-B97A9881A995}"/>
-    <dgm:cxn modelId="{F7BE5357-BB56-45F2-9D23-395488534B1F}" type="presOf" srcId="{6C91D146-AF8B-472B-9ABF-56071B15FADF}" destId="{D83F50BB-0D21-4485-AAB3-10916F710F3A}" srcOrd="0" destOrd="0" presId="urn:microsoft.com/office/officeart/2005/8/layout/chevron1"/>
     <dgm:cxn modelId="{D3478CAE-10A5-48CE-AEC4-52551B47CA43}" type="presParOf" srcId="{0B2F443D-C37B-42DD-8503-32BF7FE08A55}" destId="{5C234324-6FA9-46DA-9411-9ED67D810730}" srcOrd="0" destOrd="0" presId="urn:microsoft.com/office/officeart/2005/8/layout/chevron1"/>
     <dgm:cxn modelId="{A3B56771-18CB-4C9F-BF31-B96721E023DE}" type="presParOf" srcId="{0B2F443D-C37B-42DD-8503-32BF7FE08A55}" destId="{301D8ACE-9A00-43EB-BA3A-55C5251BD237}" srcOrd="1" destOrd="0" presId="urn:microsoft.com/office/officeart/2005/8/layout/chevron1"/>
     <dgm:cxn modelId="{0C1820D3-C1A7-4FFA-9B2A-3222143BF3BE}" type="presParOf" srcId="{0B2F443D-C37B-42DD-8503-32BF7FE08A55}" destId="{28E0AAF5-507E-4C66-B97C-86E59AE61164}" srcOrd="2" destOrd="0" presId="urn:microsoft.com/office/officeart/2005/8/layout/chevron1"/>
@@ -2709,7 +2717,8 @@
           <a:p>
             <a:fld id="{1A1ED111-49E9-403B-BF16-DEEC4F35BD53}" type="datetimeFigureOut">
               <a:rPr lang="pt-PT" smtClean="0"/>
-              <a:t>10-03-2010</a:t>
+              <a:pPr/>
+              <a:t>19-03-2010</a:t>
             </a:fld>
             <a:endParaRPr lang="pt-PT"/>
           </a:p>
@@ -2751,6 +2760,7 @@
           <a:p>
             <a:fld id="{E7008B88-F9D4-473A-916B-CD7D81776802}" type="slidenum">
               <a:rPr lang="pt-PT" smtClean="0"/>
+              <a:pPr/>
               <a:t>‹#›</a:t>
             </a:fld>
             <a:endParaRPr lang="pt-PT"/>
@@ -2874,7 +2884,8 @@
           <a:p>
             <a:fld id="{1A1ED111-49E9-403B-BF16-DEEC4F35BD53}" type="datetimeFigureOut">
               <a:rPr lang="pt-PT" smtClean="0"/>
-              <a:t>10-03-2010</a:t>
+              <a:pPr/>
+              <a:t>19-03-2010</a:t>
             </a:fld>
             <a:endParaRPr lang="pt-PT"/>
           </a:p>
@@ -2916,6 +2927,7 @@
           <a:p>
             <a:fld id="{E7008B88-F9D4-473A-916B-CD7D81776802}" type="slidenum">
               <a:rPr lang="pt-PT" smtClean="0"/>
+              <a:pPr/>
               <a:t>‹#›</a:t>
             </a:fld>
             <a:endParaRPr lang="pt-PT"/>
@@ -3049,7 +3061,8 @@
           <a:p>
             <a:fld id="{1A1ED111-49E9-403B-BF16-DEEC4F35BD53}" type="datetimeFigureOut">
               <a:rPr lang="pt-PT" smtClean="0"/>
-              <a:t>10-03-2010</a:t>
+              <a:pPr/>
+              <a:t>19-03-2010</a:t>
             </a:fld>
             <a:endParaRPr lang="pt-PT"/>
           </a:p>
@@ -3091,6 +3104,7 @@
           <a:p>
             <a:fld id="{E7008B88-F9D4-473A-916B-CD7D81776802}" type="slidenum">
               <a:rPr lang="pt-PT" smtClean="0"/>
+              <a:pPr/>
               <a:t>‹#›</a:t>
             </a:fld>
             <a:endParaRPr lang="pt-PT"/>
@@ -3214,7 +3228,8 @@
           <a:p>
             <a:fld id="{1A1ED111-49E9-403B-BF16-DEEC4F35BD53}" type="datetimeFigureOut">
               <a:rPr lang="pt-PT" smtClean="0"/>
-              <a:t>10-03-2010</a:t>
+              <a:pPr/>
+              <a:t>19-03-2010</a:t>
             </a:fld>
             <a:endParaRPr lang="pt-PT"/>
           </a:p>
@@ -3256,6 +3271,7 @@
           <a:p>
             <a:fld id="{E7008B88-F9D4-473A-916B-CD7D81776802}" type="slidenum">
               <a:rPr lang="pt-PT" smtClean="0"/>
+              <a:pPr/>
               <a:t>‹#›</a:t>
             </a:fld>
             <a:endParaRPr lang="pt-PT"/>
@@ -3455,7 +3471,8 @@
           <a:p>
             <a:fld id="{1A1ED111-49E9-403B-BF16-DEEC4F35BD53}" type="datetimeFigureOut">
               <a:rPr lang="pt-PT" smtClean="0"/>
-              <a:t>10-03-2010</a:t>
+              <a:pPr/>
+              <a:t>19-03-2010</a:t>
             </a:fld>
             <a:endParaRPr lang="pt-PT"/>
           </a:p>
@@ -3497,6 +3514,7 @@
           <a:p>
             <a:fld id="{E7008B88-F9D4-473A-916B-CD7D81776802}" type="slidenum">
               <a:rPr lang="pt-PT" smtClean="0"/>
+              <a:pPr/>
               <a:t>‹#›</a:t>
             </a:fld>
             <a:endParaRPr lang="pt-PT"/>
@@ -3738,7 +3756,8 @@
           <a:p>
             <a:fld id="{1A1ED111-49E9-403B-BF16-DEEC4F35BD53}" type="datetimeFigureOut">
               <a:rPr lang="pt-PT" smtClean="0"/>
-              <a:t>10-03-2010</a:t>
+              <a:pPr/>
+              <a:t>19-03-2010</a:t>
             </a:fld>
             <a:endParaRPr lang="pt-PT"/>
           </a:p>
@@ -3780,6 +3799,7 @@
           <a:p>
             <a:fld id="{E7008B88-F9D4-473A-916B-CD7D81776802}" type="slidenum">
               <a:rPr lang="pt-PT" smtClean="0"/>
+              <a:pPr/>
               <a:t>‹#›</a:t>
             </a:fld>
             <a:endParaRPr lang="pt-PT"/>
@@ -4155,7 +4175,8 @@
           <a:p>
             <a:fld id="{1A1ED111-49E9-403B-BF16-DEEC4F35BD53}" type="datetimeFigureOut">
               <a:rPr lang="pt-PT" smtClean="0"/>
-              <a:t>10-03-2010</a:t>
+              <a:pPr/>
+              <a:t>19-03-2010</a:t>
             </a:fld>
             <a:endParaRPr lang="pt-PT"/>
           </a:p>
@@ -4197,6 +4218,7 @@
           <a:p>
             <a:fld id="{E7008B88-F9D4-473A-916B-CD7D81776802}" type="slidenum">
               <a:rPr lang="pt-PT" smtClean="0"/>
+              <a:pPr/>
               <a:t>‹#›</a:t>
             </a:fld>
             <a:endParaRPr lang="pt-PT"/>
@@ -4268,7 +4290,8 @@
           <a:p>
             <a:fld id="{1A1ED111-49E9-403B-BF16-DEEC4F35BD53}" type="datetimeFigureOut">
               <a:rPr lang="pt-PT" smtClean="0"/>
-              <a:t>10-03-2010</a:t>
+              <a:pPr/>
+              <a:t>19-03-2010</a:t>
             </a:fld>
             <a:endParaRPr lang="pt-PT"/>
           </a:p>
@@ -4310,6 +4333,7 @@
           <a:p>
             <a:fld id="{E7008B88-F9D4-473A-916B-CD7D81776802}" type="slidenum">
               <a:rPr lang="pt-PT" smtClean="0"/>
+              <a:pPr/>
               <a:t>‹#›</a:t>
             </a:fld>
             <a:endParaRPr lang="pt-PT"/>
@@ -4358,7 +4382,8 @@
           <a:p>
             <a:fld id="{1A1ED111-49E9-403B-BF16-DEEC4F35BD53}" type="datetimeFigureOut">
               <a:rPr lang="pt-PT" smtClean="0"/>
-              <a:t>10-03-2010</a:t>
+              <a:pPr/>
+              <a:t>19-03-2010</a:t>
             </a:fld>
             <a:endParaRPr lang="pt-PT"/>
           </a:p>
@@ -4400,6 +4425,7 @@
           <a:p>
             <a:fld id="{E7008B88-F9D4-473A-916B-CD7D81776802}" type="slidenum">
               <a:rPr lang="pt-PT" smtClean="0"/>
+              <a:pPr/>
               <a:t>‹#›</a:t>
             </a:fld>
             <a:endParaRPr lang="pt-PT"/>
@@ -4630,7 +4656,8 @@
           <a:p>
             <a:fld id="{1A1ED111-49E9-403B-BF16-DEEC4F35BD53}" type="datetimeFigureOut">
               <a:rPr lang="pt-PT" smtClean="0"/>
-              <a:t>10-03-2010</a:t>
+              <a:pPr/>
+              <a:t>19-03-2010</a:t>
             </a:fld>
             <a:endParaRPr lang="pt-PT"/>
           </a:p>
@@ -4672,6 +4699,7 @@
           <a:p>
             <a:fld id="{E7008B88-F9D4-473A-916B-CD7D81776802}" type="slidenum">
               <a:rPr lang="pt-PT" smtClean="0"/>
+              <a:pPr/>
               <a:t>‹#›</a:t>
             </a:fld>
             <a:endParaRPr lang="pt-PT"/>
@@ -4878,7 +4906,8 @@
           <a:p>
             <a:fld id="{1A1ED111-49E9-403B-BF16-DEEC4F35BD53}" type="datetimeFigureOut">
               <a:rPr lang="pt-PT" smtClean="0"/>
-              <a:t>10-03-2010</a:t>
+              <a:pPr/>
+              <a:t>19-03-2010</a:t>
             </a:fld>
             <a:endParaRPr lang="pt-PT"/>
           </a:p>
@@ -4920,6 +4949,7 @@
           <a:p>
             <a:fld id="{E7008B88-F9D4-473A-916B-CD7D81776802}" type="slidenum">
               <a:rPr lang="pt-PT" smtClean="0"/>
+              <a:pPr/>
               <a:t>‹#›</a:t>
             </a:fld>
             <a:endParaRPr lang="pt-PT"/>
@@ -5086,7 +5116,8 @@
           <a:p>
             <a:fld id="{1A1ED111-49E9-403B-BF16-DEEC4F35BD53}" type="datetimeFigureOut">
               <a:rPr lang="pt-PT" smtClean="0"/>
-              <a:t>10-03-2010</a:t>
+              <a:pPr/>
+              <a:t>19-03-2010</a:t>
             </a:fld>
             <a:endParaRPr lang="pt-PT"/>
           </a:p>
@@ -5164,6 +5195,7 @@
           <a:p>
             <a:fld id="{E7008B88-F9D4-473A-916B-CD7D81776802}" type="slidenum">
               <a:rPr lang="pt-PT" smtClean="0"/>
+              <a:pPr/>
               <a:t>‹#›</a:t>
             </a:fld>
             <a:endParaRPr lang="pt-PT"/>
@@ -5456,6 +5488,73 @@
           <a:chExt cx="0" cy="0"/>
         </a:xfrm>
       </p:grpSpPr>
+      <p:sp>
+        <p:nvSpPr>
+          <p:cNvPr id="16" name="Rectangle 15"/>
+          <p:cNvSpPr/>
+          <p:nvPr/>
+        </p:nvSpPr>
+        <p:spPr>
+          <a:xfrm>
+            <a:off x="5313368" y="3013605"/>
+            <a:ext cx="1677982" cy="1504964"/>
+          </a:xfrm>
+          <a:prstGeom prst="rect">
+            <a:avLst/>
+          </a:prstGeom>
+          <a:gradFill flip="none" rotWithShape="1">
+            <a:gsLst>
+              <a:gs pos="5000">
+                <a:srgbClr val="FFFFCC">
+                  <a:alpha val="0"/>
+                </a:srgbClr>
+              </a:gs>
+              <a:gs pos="100000">
+                <a:schemeClr val="tx2">
+                  <a:lumMod val="20000"/>
+                  <a:lumOff val="80000"/>
+                </a:schemeClr>
+              </a:gs>
+              <a:gs pos="100000">
+                <a:schemeClr val="accent1">
+                  <a:tint val="23500"/>
+                  <a:satMod val="160000"/>
+                  <a:alpha val="0"/>
+                </a:schemeClr>
+              </a:gs>
+            </a:gsLst>
+            <a:lin ang="16200000" scaled="1"/>
+            <a:tileRect/>
+          </a:gradFill>
+          <a:ln>
+            <a:noFill/>
+          </a:ln>
+        </p:spPr>
+        <p:style>
+          <a:lnRef idx="2">
+            <a:schemeClr val="accent1">
+              <a:shade val="50000"/>
+            </a:schemeClr>
+          </a:lnRef>
+          <a:fillRef idx="1">
+            <a:schemeClr val="accent1"/>
+          </a:fillRef>
+          <a:effectRef idx="0">
+            <a:schemeClr val="accent1"/>
+          </a:effectRef>
+          <a:fontRef idx="minor">
+            <a:schemeClr val="lt1"/>
+          </a:fontRef>
+        </p:style>
+        <p:txBody>
+          <a:bodyPr rtlCol="0" anchor="ctr"/>
+          <a:lstStyle/>
+          <a:p>
+            <a:pPr algn="ctr"/>
+            <a:endParaRPr lang="pt-PT"/>
+          </a:p>
+        </p:txBody>
+      </p:sp>
       <p:graphicFrame>
         <p:nvGraphicFramePr>
           <p:cNvPr id="4" name="Diagram 3"/>
@@ -5463,7 +5562,7 @@
           <p:nvPr/>
         </p:nvGraphicFramePr>
         <p:xfrm>
-          <a:off x="285720" y="2890297"/>
+          <a:off x="285720" y="1928802"/>
           <a:ext cx="8572560" cy="1285884"/>
         </p:xfrm>
         <a:graphic>
@@ -5480,7 +5579,7 @@
         </p:nvSpPr>
         <p:spPr>
           <a:xfrm>
-            <a:off x="292763" y="3929066"/>
+            <a:off x="292763" y="3018371"/>
             <a:ext cx="1643074" cy="1384995"/>
           </a:xfrm>
           <a:prstGeom prst="rect">
@@ -5525,7 +5624,7 @@
         </p:nvSpPr>
         <p:spPr>
           <a:xfrm>
-            <a:off x="1954552" y="3929066"/>
+            <a:off x="1954552" y="3018371"/>
             <a:ext cx="1643074" cy="1384995"/>
           </a:xfrm>
           <a:prstGeom prst="rect">
@@ -5561,7 +5660,7 @@
         </p:nvSpPr>
         <p:spPr>
           <a:xfrm>
-            <a:off x="3643306" y="3929066"/>
+            <a:off x="3643306" y="3018371"/>
             <a:ext cx="1643074" cy="1384995"/>
           </a:xfrm>
           <a:prstGeom prst="rect">
@@ -5597,7 +5696,7 @@
         </p:nvSpPr>
         <p:spPr>
           <a:xfrm>
-            <a:off x="5312138" y="3929066"/>
+            <a:off x="5312138" y="3018371"/>
             <a:ext cx="1643074" cy="1384995"/>
           </a:xfrm>
           <a:prstGeom prst="rect">
@@ -5645,7 +5744,7 @@
         </p:nvSpPr>
         <p:spPr>
           <a:xfrm>
-            <a:off x="7000892" y="3929066"/>
+            <a:off x="7000892" y="3018371"/>
             <a:ext cx="1643074" cy="1384995"/>
           </a:xfrm>
           <a:prstGeom prst="rect">
@@ -5679,7 +5778,7 @@
         </p:nvCxnSpPr>
         <p:spPr>
           <a:xfrm rot="5400000">
-            <a:off x="6244544" y="4724051"/>
+            <a:off x="6244544" y="3762556"/>
             <a:ext cx="1500198" cy="1588"/>
           </a:xfrm>
           <a:prstGeom prst="line">
@@ -5709,7 +5808,7 @@
         </p:nvCxnSpPr>
         <p:spPr>
           <a:xfrm rot="5400000">
-            <a:off x="4562833" y="4724051"/>
+            <a:off x="4562833" y="3762556"/>
             <a:ext cx="1500198" cy="1588"/>
           </a:xfrm>
           <a:prstGeom prst="line">
@@ -5739,7 +5838,7 @@
         </p:nvCxnSpPr>
         <p:spPr>
           <a:xfrm rot="5400000">
-            <a:off x="2886958" y="4724051"/>
+            <a:off x="2886958" y="3762556"/>
             <a:ext cx="1500198" cy="1588"/>
           </a:xfrm>
           <a:prstGeom prst="line">
@@ -5769,7 +5868,7 @@
         </p:nvCxnSpPr>
         <p:spPr>
           <a:xfrm rot="5400000">
-            <a:off x="1192368" y="4724051"/>
+            <a:off x="1192368" y="3762556"/>
             <a:ext cx="1500198" cy="1588"/>
           </a:xfrm>
           <a:prstGeom prst="line">
@@ -5799,7 +5898,7 @@
         </p:nvCxnSpPr>
         <p:spPr>
           <a:xfrm rot="5400000">
-            <a:off x="-463585" y="4724051"/>
+            <a:off x="-463585" y="3762556"/>
             <a:ext cx="1500198" cy="1588"/>
           </a:xfrm>
           <a:prstGeom prst="line">
@@ -5821,6 +5920,1648 @@
           </a:fontRef>
         </p:style>
       </p:cxnSp>
+    </p:spTree>
+  </p:cSld>
+  <p:clrMapOvr>
+    <a:masterClrMapping/>
+  </p:clrMapOvr>
+</p:sld>
+</file>
+
+<file path=ppt/slides/slide2.xml><?xml version="1.0" encoding="utf-8"?>
+<p:sld xmlns:a="http://schemas.openxmlformats.org/drawingml/2006/main" xmlns:r="http://schemas.openxmlformats.org/officeDocument/2006/relationships" xmlns:p="http://schemas.openxmlformats.org/presentationml/2006/main">
+  <p:cSld>
+    <p:spTree>
+      <p:nvGrpSpPr>
+        <p:cNvPr id="1" name=""/>
+        <p:cNvGrpSpPr/>
+        <p:nvPr/>
+      </p:nvGrpSpPr>
+      <p:grpSpPr>
+        <a:xfrm>
+          <a:off x="0" y="0"/>
+          <a:ext cx="0" cy="0"/>
+          <a:chOff x="0" y="0"/>
+          <a:chExt cx="0" cy="0"/>
+        </a:xfrm>
+      </p:grpSpPr>
+      <p:sp>
+        <p:nvSpPr>
+          <p:cNvPr id="32" name="Left-Right Arrow 31"/>
+          <p:cNvSpPr/>
+          <p:nvPr/>
+        </p:nvSpPr>
+        <p:spPr>
+          <a:xfrm rot="19206970">
+            <a:off x="5170705" y="2032891"/>
+            <a:ext cx="1136945" cy="448382"/>
+          </a:xfrm>
+          <a:prstGeom prst="leftRightArrow">
+            <a:avLst>
+              <a:gd name="adj1" fmla="val 37114"/>
+              <a:gd name="adj2" fmla="val 50706"/>
+            </a:avLst>
+          </a:prstGeom>
+          <a:ln>
+            <a:noFill/>
+          </a:ln>
+        </p:spPr>
+        <p:style>
+          <a:lnRef idx="1">
+            <a:schemeClr val="dk1"/>
+          </a:lnRef>
+          <a:fillRef idx="2">
+            <a:schemeClr val="dk1"/>
+          </a:fillRef>
+          <a:effectRef idx="1">
+            <a:schemeClr val="dk1"/>
+          </a:effectRef>
+          <a:fontRef idx="minor">
+            <a:schemeClr val="dk1"/>
+          </a:fontRef>
+        </p:style>
+        <p:txBody>
+          <a:bodyPr rtlCol="0" anchor="ctr"/>
+          <a:lstStyle/>
+          <a:p>
+            <a:pPr algn="ctr"/>
+            <a:endParaRPr lang="pt-PT">
+              <a:solidFill>
+                <a:schemeClr val="dk1"/>
+              </a:solidFill>
+            </a:endParaRPr>
+          </a:p>
+        </p:txBody>
+      </p:sp>
+      <p:grpSp>
+        <p:nvGrpSpPr>
+          <p:cNvPr id="23" name="Group 22"/>
+          <p:cNvGrpSpPr/>
+          <p:nvPr/>
+        </p:nvGrpSpPr>
+        <p:grpSpPr>
+          <a:xfrm>
+            <a:off x="2105008" y="2298134"/>
+            <a:ext cx="1357322" cy="1785950"/>
+            <a:chOff x="2247353" y="2357430"/>
+            <a:chExt cx="1357322" cy="1785950"/>
+          </a:xfrm>
+        </p:grpSpPr>
+        <p:sp>
+          <p:nvSpPr>
+            <p:cNvPr id="8" name="Flowchart: Document 7"/>
+            <p:cNvSpPr/>
+            <p:nvPr/>
+          </p:nvSpPr>
+          <p:spPr>
+            <a:xfrm>
+              <a:off x="2382291" y="2357430"/>
+              <a:ext cx="1071570" cy="1785950"/>
+            </a:xfrm>
+            <a:prstGeom prst="flowChartDocument">
+              <a:avLst/>
+            </a:prstGeom>
+          </p:spPr>
+          <p:style>
+            <a:lnRef idx="2">
+              <a:schemeClr val="accent1"/>
+            </a:lnRef>
+            <a:fillRef idx="1">
+              <a:schemeClr val="lt1"/>
+            </a:fillRef>
+            <a:effectRef idx="0">
+              <a:schemeClr val="accent1"/>
+            </a:effectRef>
+            <a:fontRef idx="minor">
+              <a:schemeClr val="dk1"/>
+            </a:fontRef>
+          </p:style>
+          <p:txBody>
+            <a:bodyPr rtlCol="0" anchor="ctr"/>
+            <a:lstStyle/>
+            <a:p>
+              <a:pPr algn="ctr"/>
+              <a:endParaRPr lang="pt-PT"/>
+            </a:p>
+          </p:txBody>
+        </p:sp>
+        <p:cxnSp>
+          <p:nvCxnSpPr>
+            <p:cNvPr id="12" name="Straight Connector 11"/>
+            <p:cNvCxnSpPr/>
+            <p:nvPr/>
+          </p:nvCxnSpPr>
+          <p:spPr>
+            <a:xfrm>
+              <a:off x="2453729" y="2500306"/>
+              <a:ext cx="936640" cy="1588"/>
+            </a:xfrm>
+            <a:prstGeom prst="line">
+              <a:avLst/>
+            </a:prstGeom>
+            <a:ln>
+              <a:solidFill>
+                <a:schemeClr val="bg1">
+                  <a:lumMod val="75000"/>
+                </a:schemeClr>
+              </a:solidFill>
+            </a:ln>
+          </p:spPr>
+          <p:style>
+            <a:lnRef idx="1">
+              <a:schemeClr val="accent1"/>
+            </a:lnRef>
+            <a:fillRef idx="0">
+              <a:schemeClr val="accent1"/>
+            </a:fillRef>
+            <a:effectRef idx="0">
+              <a:schemeClr val="accent1"/>
+            </a:effectRef>
+            <a:fontRef idx="minor">
+              <a:schemeClr val="tx1"/>
+            </a:fontRef>
+          </p:style>
+        </p:cxnSp>
+        <p:cxnSp>
+          <p:nvCxnSpPr>
+            <p:cNvPr id="13" name="Straight Connector 12"/>
+            <p:cNvCxnSpPr/>
+            <p:nvPr/>
+          </p:nvCxnSpPr>
+          <p:spPr>
+            <a:xfrm>
+              <a:off x="2453729" y="2687632"/>
+              <a:ext cx="936640" cy="1588"/>
+            </a:xfrm>
+            <a:prstGeom prst="line">
+              <a:avLst/>
+            </a:prstGeom>
+            <a:ln>
+              <a:solidFill>
+                <a:schemeClr val="bg1">
+                  <a:lumMod val="75000"/>
+                </a:schemeClr>
+              </a:solidFill>
+            </a:ln>
+          </p:spPr>
+          <p:style>
+            <a:lnRef idx="1">
+              <a:schemeClr val="accent1"/>
+            </a:lnRef>
+            <a:fillRef idx="0">
+              <a:schemeClr val="accent1"/>
+            </a:fillRef>
+            <a:effectRef idx="0">
+              <a:schemeClr val="accent1"/>
+            </a:effectRef>
+            <a:fontRef idx="minor">
+              <a:schemeClr val="tx1"/>
+            </a:fontRef>
+          </p:style>
+        </p:cxnSp>
+        <p:cxnSp>
+          <p:nvCxnSpPr>
+            <p:cNvPr id="14" name="Straight Connector 13"/>
+            <p:cNvCxnSpPr/>
+            <p:nvPr/>
+          </p:nvCxnSpPr>
+          <p:spPr>
+            <a:xfrm>
+              <a:off x="2453729" y="2874958"/>
+              <a:ext cx="936640" cy="1588"/>
+            </a:xfrm>
+            <a:prstGeom prst="line">
+              <a:avLst/>
+            </a:prstGeom>
+            <a:ln>
+              <a:solidFill>
+                <a:schemeClr val="bg1">
+                  <a:lumMod val="75000"/>
+                </a:schemeClr>
+              </a:solidFill>
+            </a:ln>
+          </p:spPr>
+          <p:style>
+            <a:lnRef idx="1">
+              <a:schemeClr val="accent1"/>
+            </a:lnRef>
+            <a:fillRef idx="0">
+              <a:schemeClr val="accent1"/>
+            </a:fillRef>
+            <a:effectRef idx="0">
+              <a:schemeClr val="accent1"/>
+            </a:effectRef>
+            <a:fontRef idx="minor">
+              <a:schemeClr val="tx1"/>
+            </a:fontRef>
+          </p:style>
+        </p:cxnSp>
+        <p:cxnSp>
+          <p:nvCxnSpPr>
+            <p:cNvPr id="15" name="Straight Connector 14"/>
+            <p:cNvCxnSpPr/>
+            <p:nvPr/>
+          </p:nvCxnSpPr>
+          <p:spPr>
+            <a:xfrm>
+              <a:off x="2453729" y="3062284"/>
+              <a:ext cx="936640" cy="1588"/>
+            </a:xfrm>
+            <a:prstGeom prst="line">
+              <a:avLst/>
+            </a:prstGeom>
+            <a:ln>
+              <a:solidFill>
+                <a:schemeClr val="bg1">
+                  <a:lumMod val="75000"/>
+                </a:schemeClr>
+              </a:solidFill>
+            </a:ln>
+          </p:spPr>
+          <p:style>
+            <a:lnRef idx="1">
+              <a:schemeClr val="accent1"/>
+            </a:lnRef>
+            <a:fillRef idx="0">
+              <a:schemeClr val="accent1"/>
+            </a:fillRef>
+            <a:effectRef idx="0">
+              <a:schemeClr val="accent1"/>
+            </a:effectRef>
+            <a:fontRef idx="minor">
+              <a:schemeClr val="tx1"/>
+            </a:fontRef>
+          </p:style>
+        </p:cxnSp>
+        <p:cxnSp>
+          <p:nvCxnSpPr>
+            <p:cNvPr id="16" name="Straight Connector 15"/>
+            <p:cNvCxnSpPr/>
+            <p:nvPr/>
+          </p:nvCxnSpPr>
+          <p:spPr>
+            <a:xfrm>
+              <a:off x="2453729" y="3249610"/>
+              <a:ext cx="936640" cy="1588"/>
+            </a:xfrm>
+            <a:prstGeom prst="line">
+              <a:avLst/>
+            </a:prstGeom>
+            <a:ln>
+              <a:solidFill>
+                <a:schemeClr val="bg1">
+                  <a:lumMod val="75000"/>
+                </a:schemeClr>
+              </a:solidFill>
+            </a:ln>
+          </p:spPr>
+          <p:style>
+            <a:lnRef idx="1">
+              <a:schemeClr val="accent1"/>
+            </a:lnRef>
+            <a:fillRef idx="0">
+              <a:schemeClr val="accent1"/>
+            </a:fillRef>
+            <a:effectRef idx="0">
+              <a:schemeClr val="accent1"/>
+            </a:effectRef>
+            <a:fontRef idx="minor">
+              <a:schemeClr val="tx1"/>
+            </a:fontRef>
+          </p:style>
+        </p:cxnSp>
+        <p:cxnSp>
+          <p:nvCxnSpPr>
+            <p:cNvPr id="17" name="Straight Connector 16"/>
+            <p:cNvCxnSpPr/>
+            <p:nvPr/>
+          </p:nvCxnSpPr>
+          <p:spPr>
+            <a:xfrm>
+              <a:off x="2453729" y="3436936"/>
+              <a:ext cx="936640" cy="1588"/>
+            </a:xfrm>
+            <a:prstGeom prst="line">
+              <a:avLst/>
+            </a:prstGeom>
+            <a:ln>
+              <a:solidFill>
+                <a:schemeClr val="bg1">
+                  <a:lumMod val="75000"/>
+                </a:schemeClr>
+              </a:solidFill>
+            </a:ln>
+          </p:spPr>
+          <p:style>
+            <a:lnRef idx="1">
+              <a:schemeClr val="accent1"/>
+            </a:lnRef>
+            <a:fillRef idx="0">
+              <a:schemeClr val="accent1"/>
+            </a:fillRef>
+            <a:effectRef idx="0">
+              <a:schemeClr val="accent1"/>
+            </a:effectRef>
+            <a:fontRef idx="minor">
+              <a:schemeClr val="tx1"/>
+            </a:fontRef>
+          </p:style>
+        </p:cxnSp>
+        <p:cxnSp>
+          <p:nvCxnSpPr>
+            <p:cNvPr id="18" name="Straight Connector 17"/>
+            <p:cNvCxnSpPr/>
+            <p:nvPr/>
+          </p:nvCxnSpPr>
+          <p:spPr>
+            <a:xfrm>
+              <a:off x="2453729" y="3624262"/>
+              <a:ext cx="936640" cy="1588"/>
+            </a:xfrm>
+            <a:prstGeom prst="line">
+              <a:avLst/>
+            </a:prstGeom>
+            <a:ln>
+              <a:solidFill>
+                <a:schemeClr val="bg1">
+                  <a:lumMod val="75000"/>
+                </a:schemeClr>
+              </a:solidFill>
+            </a:ln>
+          </p:spPr>
+          <p:style>
+            <a:lnRef idx="1">
+              <a:schemeClr val="accent1"/>
+            </a:lnRef>
+            <a:fillRef idx="0">
+              <a:schemeClr val="accent1"/>
+            </a:fillRef>
+            <a:effectRef idx="0">
+              <a:schemeClr val="accent1"/>
+            </a:effectRef>
+            <a:fontRef idx="minor">
+              <a:schemeClr val="tx1"/>
+            </a:fontRef>
+          </p:style>
+        </p:cxnSp>
+        <p:sp>
+          <p:nvSpPr>
+            <p:cNvPr id="10" name="TextBox 9"/>
+            <p:cNvSpPr txBox="1"/>
+            <p:nvPr/>
+          </p:nvSpPr>
+          <p:spPr>
+            <a:xfrm>
+              <a:off x="2247353" y="2732082"/>
+              <a:ext cx="1357322" cy="584775"/>
+            </a:xfrm>
+            <a:prstGeom prst="rect">
+              <a:avLst/>
+            </a:prstGeom>
+            <a:noFill/>
+          </p:spPr>
+          <p:txBody>
+            <a:bodyPr wrap="square" rtlCol="0">
+              <a:spAutoFit/>
+            </a:bodyPr>
+            <a:lstStyle/>
+            <a:p>
+              <a:pPr algn="ctr"/>
+              <a:r>
+                <a:rPr lang="pt-PT" sz="1600" dirty="0" smtClean="0">
+                  <a:solidFill>
+                    <a:schemeClr val="tx1">
+                      <a:lumMod val="65000"/>
+                      <a:lumOff val="35000"/>
+                    </a:schemeClr>
+                  </a:solidFill>
+                  <a:effectLst>
+                    <a:outerShdw blurRad="38100" dist="38100" dir="2700000" algn="tl">
+                      <a:srgbClr val="000000">
+                        <a:alpha val="43137"/>
+                      </a:srgbClr>
+                    </a:outerShdw>
+                  </a:effectLst>
+                </a:rPr>
+                <a:t>Meta informação</a:t>
+              </a:r>
+              <a:endParaRPr lang="pt-PT" sz="1600" dirty="0">
+                <a:solidFill>
+                  <a:schemeClr val="tx1">
+                    <a:lumMod val="65000"/>
+                    <a:lumOff val="35000"/>
+                  </a:schemeClr>
+                </a:solidFill>
+                <a:effectLst>
+                  <a:outerShdw blurRad="38100" dist="38100" dir="2700000" algn="tl">
+                    <a:srgbClr val="000000">
+                      <a:alpha val="43137"/>
+                    </a:srgbClr>
+                  </a:outerShdw>
+                </a:effectLst>
+              </a:endParaRPr>
+            </a:p>
+          </p:txBody>
+        </p:sp>
+      </p:grpSp>
+      <p:sp>
+        <p:nvSpPr>
+          <p:cNvPr id="24" name="Oval 23"/>
+          <p:cNvSpPr/>
+          <p:nvPr/>
+        </p:nvSpPr>
+        <p:spPr>
+          <a:xfrm>
+            <a:off x="117444" y="2500306"/>
+            <a:ext cx="1214446" cy="1214446"/>
+          </a:xfrm>
+          <a:prstGeom prst="ellipse">
+            <a:avLst/>
+          </a:prstGeom>
+        </p:spPr>
+        <p:style>
+          <a:lnRef idx="0">
+            <a:schemeClr val="accent4"/>
+          </a:lnRef>
+          <a:fillRef idx="3">
+            <a:schemeClr val="accent4"/>
+          </a:fillRef>
+          <a:effectRef idx="3">
+            <a:schemeClr val="accent4"/>
+          </a:effectRef>
+          <a:fontRef idx="minor">
+            <a:schemeClr val="lt1"/>
+          </a:fontRef>
+        </p:style>
+        <p:txBody>
+          <a:bodyPr rtlCol="0" anchor="ctr"/>
+          <a:lstStyle/>
+          <a:p>
+            <a:pPr algn="ctr"/>
+            <a:r>
+              <a:rPr lang="pt-PT" dirty="0" smtClean="0"/>
+              <a:t>Análise</a:t>
+            </a:r>
+            <a:endParaRPr lang="pt-PT" dirty="0"/>
+          </a:p>
+        </p:txBody>
+      </p:sp>
+      <p:sp>
+        <p:nvSpPr>
+          <p:cNvPr id="25" name="Oval 24"/>
+          <p:cNvSpPr/>
+          <p:nvPr/>
+        </p:nvSpPr>
+        <p:spPr>
+          <a:xfrm>
+            <a:off x="4214810" y="2500306"/>
+            <a:ext cx="1214446" cy="1214446"/>
+          </a:xfrm>
+          <a:prstGeom prst="ellipse">
+            <a:avLst/>
+          </a:prstGeom>
+        </p:spPr>
+        <p:style>
+          <a:lnRef idx="0">
+            <a:schemeClr val="accent1"/>
+          </a:lnRef>
+          <a:fillRef idx="3">
+            <a:schemeClr val="accent1"/>
+          </a:fillRef>
+          <a:effectRef idx="3">
+            <a:schemeClr val="accent1"/>
+          </a:effectRef>
+          <a:fontRef idx="minor">
+            <a:schemeClr val="lt1"/>
+          </a:fontRef>
+        </p:style>
+        <p:txBody>
+          <a:bodyPr wrap="none" rtlCol="0" anchor="ctr"/>
+          <a:lstStyle/>
+          <a:p>
+            <a:pPr algn="ctr"/>
+            <a:r>
+              <a:rPr lang="pt-PT" sz="1600" dirty="0" smtClean="0"/>
+              <a:t>Coordenador</a:t>
+            </a:r>
+            <a:endParaRPr lang="pt-PT" sz="1600" dirty="0"/>
+          </a:p>
+        </p:txBody>
+      </p:sp>
+      <p:sp>
+        <p:nvSpPr>
+          <p:cNvPr id="26" name="Right Arrow 25"/>
+          <p:cNvSpPr/>
+          <p:nvPr/>
+        </p:nvSpPr>
+        <p:spPr>
+          <a:xfrm>
+            <a:off x="3457568" y="2890834"/>
+            <a:ext cx="642942" cy="357190"/>
+          </a:xfrm>
+          <a:prstGeom prst="rightArrow">
+            <a:avLst/>
+          </a:prstGeom>
+          <a:ln>
+            <a:noFill/>
+          </a:ln>
+        </p:spPr>
+        <p:style>
+          <a:lnRef idx="1">
+            <a:schemeClr val="dk1"/>
+          </a:lnRef>
+          <a:fillRef idx="2">
+            <a:schemeClr val="dk1"/>
+          </a:fillRef>
+          <a:effectRef idx="1">
+            <a:schemeClr val="dk1"/>
+          </a:effectRef>
+          <a:fontRef idx="minor">
+            <a:schemeClr val="dk1"/>
+          </a:fontRef>
+        </p:style>
+        <p:txBody>
+          <a:bodyPr rtlCol="0" anchor="ctr"/>
+          <a:lstStyle/>
+          <a:p>
+            <a:pPr algn="ctr"/>
+            <a:endParaRPr lang="pt-PT"/>
+          </a:p>
+        </p:txBody>
+      </p:sp>
+      <p:sp>
+        <p:nvSpPr>
+          <p:cNvPr id="27" name="Right Arrow 26"/>
+          <p:cNvSpPr/>
+          <p:nvPr/>
+        </p:nvSpPr>
+        <p:spPr>
+          <a:xfrm>
+            <a:off x="1462066" y="2890834"/>
+            <a:ext cx="642942" cy="357190"/>
+          </a:xfrm>
+          <a:prstGeom prst="rightArrow">
+            <a:avLst/>
+          </a:prstGeom>
+          <a:ln>
+            <a:noFill/>
+          </a:ln>
+        </p:spPr>
+        <p:style>
+          <a:lnRef idx="1">
+            <a:schemeClr val="dk1"/>
+          </a:lnRef>
+          <a:fillRef idx="2">
+            <a:schemeClr val="dk1"/>
+          </a:fillRef>
+          <a:effectRef idx="1">
+            <a:schemeClr val="dk1"/>
+          </a:effectRef>
+          <a:fontRef idx="minor">
+            <a:schemeClr val="dk1"/>
+          </a:fontRef>
+        </p:style>
+        <p:txBody>
+          <a:bodyPr rtlCol="0" anchor="ctr"/>
+          <a:lstStyle/>
+          <a:p>
+            <a:pPr algn="ctr"/>
+            <a:endParaRPr lang="pt-PT"/>
+          </a:p>
+        </p:txBody>
+      </p:sp>
+      <p:sp>
+        <p:nvSpPr>
+          <p:cNvPr id="28" name="Oval 27"/>
+          <p:cNvSpPr/>
+          <p:nvPr/>
+        </p:nvSpPr>
+        <p:spPr>
+          <a:xfrm>
+            <a:off x="6143636" y="1041384"/>
+            <a:ext cx="1071570" cy="1071570"/>
+          </a:xfrm>
+          <a:prstGeom prst="ellipse">
+            <a:avLst/>
+          </a:prstGeom>
+        </p:spPr>
+        <p:style>
+          <a:lnRef idx="0">
+            <a:schemeClr val="accent5"/>
+          </a:lnRef>
+          <a:fillRef idx="3">
+            <a:schemeClr val="accent5"/>
+          </a:fillRef>
+          <a:effectRef idx="3">
+            <a:schemeClr val="accent5"/>
+          </a:effectRef>
+          <a:fontRef idx="minor">
+            <a:schemeClr val="lt1"/>
+          </a:fontRef>
+        </p:style>
+        <p:txBody>
+          <a:bodyPr wrap="none" rtlCol="0" anchor="ctr"/>
+          <a:lstStyle/>
+          <a:p>
+            <a:pPr algn="ctr"/>
+            <a:r>
+              <a:rPr lang="pt-PT" sz="1600" dirty="0" smtClean="0"/>
+              <a:t>Gerador</a:t>
+            </a:r>
+          </a:p>
+          <a:p>
+            <a:pPr algn="ctr"/>
+            <a:r>
+              <a:rPr lang="pt-PT" sz="1600" dirty="0" smtClean="0"/>
+              <a:t>.NET</a:t>
+            </a:r>
+            <a:endParaRPr lang="pt-PT" sz="1600" dirty="0"/>
+          </a:p>
+        </p:txBody>
+      </p:sp>
+      <p:sp>
+        <p:nvSpPr>
+          <p:cNvPr id="29" name="Oval 28"/>
+          <p:cNvSpPr/>
+          <p:nvPr/>
+        </p:nvSpPr>
+        <p:spPr>
+          <a:xfrm>
+            <a:off x="6143636" y="2577301"/>
+            <a:ext cx="1071570" cy="1071570"/>
+          </a:xfrm>
+          <a:prstGeom prst="ellipse">
+            <a:avLst/>
+          </a:prstGeom>
+        </p:spPr>
+        <p:style>
+          <a:lnRef idx="0">
+            <a:schemeClr val="accent5"/>
+          </a:lnRef>
+          <a:fillRef idx="3">
+            <a:schemeClr val="accent5"/>
+          </a:fillRef>
+          <a:effectRef idx="3">
+            <a:schemeClr val="accent5"/>
+          </a:effectRef>
+          <a:fontRef idx="minor">
+            <a:schemeClr val="lt1"/>
+          </a:fontRef>
+        </p:style>
+        <p:txBody>
+          <a:bodyPr wrap="none" rtlCol="0" anchor="ctr"/>
+          <a:lstStyle/>
+          <a:p>
+            <a:pPr algn="ctr"/>
+            <a:r>
+              <a:rPr lang="pt-PT" sz="1600" dirty="0" smtClean="0"/>
+              <a:t>Gerador</a:t>
+            </a:r>
+          </a:p>
+          <a:p>
+            <a:pPr algn="ctr"/>
+            <a:r>
+              <a:rPr lang="pt-PT" sz="1600" dirty="0" smtClean="0"/>
+              <a:t>SQL</a:t>
+            </a:r>
+            <a:endParaRPr lang="pt-PT" sz="1600" dirty="0"/>
+          </a:p>
+        </p:txBody>
+      </p:sp>
+      <p:sp>
+        <p:nvSpPr>
+          <p:cNvPr id="30" name="Oval 29"/>
+          <p:cNvSpPr/>
+          <p:nvPr/>
+        </p:nvSpPr>
+        <p:spPr>
+          <a:xfrm>
+            <a:off x="6143636" y="4113218"/>
+            <a:ext cx="1071570" cy="1071570"/>
+          </a:xfrm>
+          <a:prstGeom prst="ellipse">
+            <a:avLst/>
+          </a:prstGeom>
+        </p:spPr>
+        <p:style>
+          <a:lnRef idx="0">
+            <a:schemeClr val="accent5"/>
+          </a:lnRef>
+          <a:fillRef idx="3">
+            <a:schemeClr val="accent5"/>
+          </a:fillRef>
+          <a:effectRef idx="3">
+            <a:schemeClr val="accent5"/>
+          </a:effectRef>
+          <a:fontRef idx="minor">
+            <a:schemeClr val="lt1"/>
+          </a:fontRef>
+        </p:style>
+        <p:txBody>
+          <a:bodyPr wrap="none" rtlCol="0" anchor="ctr"/>
+          <a:lstStyle/>
+          <a:p>
+            <a:pPr algn="ctr"/>
+            <a:r>
+              <a:rPr lang="pt-PT" sz="1600" dirty="0" smtClean="0"/>
+              <a:t>Gerador</a:t>
+            </a:r>
+          </a:p>
+          <a:p>
+            <a:pPr algn="ctr"/>
+            <a:r>
+              <a:rPr lang="pt-PT" sz="1600" dirty="0" smtClean="0"/>
+              <a:t>Java</a:t>
+            </a:r>
+            <a:endParaRPr lang="pt-PT" sz="1600" dirty="0"/>
+          </a:p>
+        </p:txBody>
+      </p:sp>
+      <p:sp>
+        <p:nvSpPr>
+          <p:cNvPr id="34" name="Left-Right Arrow 33"/>
+          <p:cNvSpPr/>
+          <p:nvPr/>
+        </p:nvSpPr>
+        <p:spPr>
+          <a:xfrm rot="2393030" flipV="1">
+            <a:off x="5145305" y="3765581"/>
+            <a:ext cx="1136945" cy="448382"/>
+          </a:xfrm>
+          <a:prstGeom prst="leftRightArrow">
+            <a:avLst>
+              <a:gd name="adj1" fmla="val 37114"/>
+              <a:gd name="adj2" fmla="val 50706"/>
+            </a:avLst>
+          </a:prstGeom>
+          <a:ln>
+            <a:noFill/>
+          </a:ln>
+        </p:spPr>
+        <p:style>
+          <a:lnRef idx="1">
+            <a:schemeClr val="dk1"/>
+          </a:lnRef>
+          <a:fillRef idx="2">
+            <a:schemeClr val="dk1"/>
+          </a:fillRef>
+          <a:effectRef idx="1">
+            <a:schemeClr val="dk1"/>
+          </a:effectRef>
+          <a:fontRef idx="minor">
+            <a:schemeClr val="dk1"/>
+          </a:fontRef>
+        </p:style>
+        <p:txBody>
+          <a:bodyPr rtlCol="0" anchor="ctr"/>
+          <a:lstStyle/>
+          <a:p>
+            <a:pPr algn="ctr"/>
+            <a:endParaRPr lang="pt-PT">
+              <a:solidFill>
+                <a:schemeClr val="dk1"/>
+              </a:solidFill>
+            </a:endParaRPr>
+          </a:p>
+        </p:txBody>
+      </p:sp>
+      <p:sp>
+        <p:nvSpPr>
+          <p:cNvPr id="35" name="Left-Right Arrow 34"/>
+          <p:cNvSpPr/>
+          <p:nvPr/>
+        </p:nvSpPr>
+        <p:spPr>
+          <a:xfrm flipV="1">
+            <a:off x="5543556" y="2960684"/>
+            <a:ext cx="528642" cy="306390"/>
+          </a:xfrm>
+          <a:prstGeom prst="leftRightArrow">
+            <a:avLst>
+              <a:gd name="adj1" fmla="val 22952"/>
+              <a:gd name="adj2" fmla="val 47874"/>
+            </a:avLst>
+          </a:prstGeom>
+          <a:ln>
+            <a:noFill/>
+          </a:ln>
+        </p:spPr>
+        <p:style>
+          <a:lnRef idx="1">
+            <a:schemeClr val="dk1"/>
+          </a:lnRef>
+          <a:fillRef idx="2">
+            <a:schemeClr val="dk1"/>
+          </a:fillRef>
+          <a:effectRef idx="1">
+            <a:schemeClr val="dk1"/>
+          </a:effectRef>
+          <a:fontRef idx="minor">
+            <a:schemeClr val="dk1"/>
+          </a:fontRef>
+        </p:style>
+        <p:txBody>
+          <a:bodyPr rtlCol="0" anchor="ctr"/>
+          <a:lstStyle/>
+          <a:p>
+            <a:pPr algn="ctr"/>
+            <a:endParaRPr lang="pt-PT">
+              <a:solidFill>
+                <a:schemeClr val="dk1"/>
+              </a:solidFill>
+            </a:endParaRPr>
+          </a:p>
+        </p:txBody>
+      </p:sp>
+      <p:grpSp>
+        <p:nvGrpSpPr>
+          <p:cNvPr id="47" name="Group 46"/>
+          <p:cNvGrpSpPr/>
+          <p:nvPr/>
+        </p:nvGrpSpPr>
+        <p:grpSpPr>
+          <a:xfrm>
+            <a:off x="8001024" y="1104347"/>
+            <a:ext cx="642942" cy="928694"/>
+            <a:chOff x="3635368" y="4538646"/>
+            <a:chExt cx="1071570" cy="1785950"/>
+          </a:xfrm>
+        </p:grpSpPr>
+        <p:sp>
+          <p:nvSpPr>
+            <p:cNvPr id="38" name="Flowchart: Document 37"/>
+            <p:cNvSpPr/>
+            <p:nvPr/>
+          </p:nvSpPr>
+          <p:spPr>
+            <a:xfrm>
+              <a:off x="3635368" y="4538646"/>
+              <a:ext cx="1071570" cy="1785950"/>
+            </a:xfrm>
+            <a:prstGeom prst="flowChartDocument">
+              <a:avLst/>
+            </a:prstGeom>
+          </p:spPr>
+          <p:style>
+            <a:lnRef idx="2">
+              <a:schemeClr val="accent1"/>
+            </a:lnRef>
+            <a:fillRef idx="1">
+              <a:schemeClr val="lt1"/>
+            </a:fillRef>
+            <a:effectRef idx="0">
+              <a:schemeClr val="accent1"/>
+            </a:effectRef>
+            <a:fontRef idx="minor">
+              <a:schemeClr val="dk1"/>
+            </a:fontRef>
+          </p:style>
+          <p:txBody>
+            <a:bodyPr rtlCol="0" anchor="ctr"/>
+            <a:lstStyle/>
+            <a:p>
+              <a:pPr algn="ctr"/>
+              <a:endParaRPr lang="pt-PT"/>
+            </a:p>
+          </p:txBody>
+        </p:sp>
+        <p:cxnSp>
+          <p:nvCxnSpPr>
+            <p:cNvPr id="39" name="Straight Connector 38"/>
+            <p:cNvCxnSpPr/>
+            <p:nvPr/>
+          </p:nvCxnSpPr>
+          <p:spPr>
+            <a:xfrm>
+              <a:off x="3706806" y="4681522"/>
+              <a:ext cx="936640" cy="1588"/>
+            </a:xfrm>
+            <a:prstGeom prst="line">
+              <a:avLst/>
+            </a:prstGeom>
+            <a:ln>
+              <a:solidFill>
+                <a:schemeClr val="bg1">
+                  <a:lumMod val="75000"/>
+                </a:schemeClr>
+              </a:solidFill>
+            </a:ln>
+          </p:spPr>
+          <p:style>
+            <a:lnRef idx="1">
+              <a:schemeClr val="accent1"/>
+            </a:lnRef>
+            <a:fillRef idx="0">
+              <a:schemeClr val="accent1"/>
+            </a:fillRef>
+            <a:effectRef idx="0">
+              <a:schemeClr val="accent1"/>
+            </a:effectRef>
+            <a:fontRef idx="minor">
+              <a:schemeClr val="tx1"/>
+            </a:fontRef>
+          </p:style>
+        </p:cxnSp>
+        <p:cxnSp>
+          <p:nvCxnSpPr>
+            <p:cNvPr id="40" name="Straight Connector 39"/>
+            <p:cNvCxnSpPr/>
+            <p:nvPr/>
+          </p:nvCxnSpPr>
+          <p:spPr>
+            <a:xfrm>
+              <a:off x="3706806" y="4868848"/>
+              <a:ext cx="936640" cy="1588"/>
+            </a:xfrm>
+            <a:prstGeom prst="line">
+              <a:avLst/>
+            </a:prstGeom>
+            <a:ln>
+              <a:solidFill>
+                <a:schemeClr val="bg1">
+                  <a:lumMod val="75000"/>
+                </a:schemeClr>
+              </a:solidFill>
+            </a:ln>
+          </p:spPr>
+          <p:style>
+            <a:lnRef idx="1">
+              <a:schemeClr val="accent1"/>
+            </a:lnRef>
+            <a:fillRef idx="0">
+              <a:schemeClr val="accent1"/>
+            </a:fillRef>
+            <a:effectRef idx="0">
+              <a:schemeClr val="accent1"/>
+            </a:effectRef>
+            <a:fontRef idx="minor">
+              <a:schemeClr val="tx1"/>
+            </a:fontRef>
+          </p:style>
+        </p:cxnSp>
+        <p:cxnSp>
+          <p:nvCxnSpPr>
+            <p:cNvPr id="41" name="Straight Connector 40"/>
+            <p:cNvCxnSpPr/>
+            <p:nvPr/>
+          </p:nvCxnSpPr>
+          <p:spPr>
+            <a:xfrm>
+              <a:off x="3706806" y="5056174"/>
+              <a:ext cx="936640" cy="1588"/>
+            </a:xfrm>
+            <a:prstGeom prst="line">
+              <a:avLst/>
+            </a:prstGeom>
+            <a:ln>
+              <a:solidFill>
+                <a:schemeClr val="bg1">
+                  <a:lumMod val="75000"/>
+                </a:schemeClr>
+              </a:solidFill>
+            </a:ln>
+          </p:spPr>
+          <p:style>
+            <a:lnRef idx="1">
+              <a:schemeClr val="accent1"/>
+            </a:lnRef>
+            <a:fillRef idx="0">
+              <a:schemeClr val="accent1"/>
+            </a:fillRef>
+            <a:effectRef idx="0">
+              <a:schemeClr val="accent1"/>
+            </a:effectRef>
+            <a:fontRef idx="minor">
+              <a:schemeClr val="tx1"/>
+            </a:fontRef>
+          </p:style>
+        </p:cxnSp>
+        <p:cxnSp>
+          <p:nvCxnSpPr>
+            <p:cNvPr id="42" name="Straight Connector 41"/>
+            <p:cNvCxnSpPr/>
+            <p:nvPr/>
+          </p:nvCxnSpPr>
+          <p:spPr>
+            <a:xfrm>
+              <a:off x="3706806" y="5243500"/>
+              <a:ext cx="936640" cy="1588"/>
+            </a:xfrm>
+            <a:prstGeom prst="line">
+              <a:avLst/>
+            </a:prstGeom>
+            <a:ln>
+              <a:solidFill>
+                <a:schemeClr val="bg1">
+                  <a:lumMod val="75000"/>
+                </a:schemeClr>
+              </a:solidFill>
+            </a:ln>
+          </p:spPr>
+          <p:style>
+            <a:lnRef idx="1">
+              <a:schemeClr val="accent1"/>
+            </a:lnRef>
+            <a:fillRef idx="0">
+              <a:schemeClr val="accent1"/>
+            </a:fillRef>
+            <a:effectRef idx="0">
+              <a:schemeClr val="accent1"/>
+            </a:effectRef>
+            <a:fontRef idx="minor">
+              <a:schemeClr val="tx1"/>
+            </a:fontRef>
+          </p:style>
+        </p:cxnSp>
+        <p:cxnSp>
+          <p:nvCxnSpPr>
+            <p:cNvPr id="43" name="Straight Connector 42"/>
+            <p:cNvCxnSpPr/>
+            <p:nvPr/>
+          </p:nvCxnSpPr>
+          <p:spPr>
+            <a:xfrm>
+              <a:off x="3706806" y="5430826"/>
+              <a:ext cx="936640" cy="1588"/>
+            </a:xfrm>
+            <a:prstGeom prst="line">
+              <a:avLst/>
+            </a:prstGeom>
+            <a:ln>
+              <a:solidFill>
+                <a:schemeClr val="bg1">
+                  <a:lumMod val="75000"/>
+                </a:schemeClr>
+              </a:solidFill>
+            </a:ln>
+          </p:spPr>
+          <p:style>
+            <a:lnRef idx="1">
+              <a:schemeClr val="accent1"/>
+            </a:lnRef>
+            <a:fillRef idx="0">
+              <a:schemeClr val="accent1"/>
+            </a:fillRef>
+            <a:effectRef idx="0">
+              <a:schemeClr val="accent1"/>
+            </a:effectRef>
+            <a:fontRef idx="minor">
+              <a:schemeClr val="tx1"/>
+            </a:fontRef>
+          </p:style>
+        </p:cxnSp>
+        <p:cxnSp>
+          <p:nvCxnSpPr>
+            <p:cNvPr id="44" name="Straight Connector 43"/>
+            <p:cNvCxnSpPr/>
+            <p:nvPr/>
+          </p:nvCxnSpPr>
+          <p:spPr>
+            <a:xfrm>
+              <a:off x="3706806" y="5618152"/>
+              <a:ext cx="936640" cy="1588"/>
+            </a:xfrm>
+            <a:prstGeom prst="line">
+              <a:avLst/>
+            </a:prstGeom>
+            <a:ln>
+              <a:solidFill>
+                <a:schemeClr val="bg1">
+                  <a:lumMod val="75000"/>
+                </a:schemeClr>
+              </a:solidFill>
+            </a:ln>
+          </p:spPr>
+          <p:style>
+            <a:lnRef idx="1">
+              <a:schemeClr val="accent1"/>
+            </a:lnRef>
+            <a:fillRef idx="0">
+              <a:schemeClr val="accent1"/>
+            </a:fillRef>
+            <a:effectRef idx="0">
+              <a:schemeClr val="accent1"/>
+            </a:effectRef>
+            <a:fontRef idx="minor">
+              <a:schemeClr val="tx1"/>
+            </a:fontRef>
+          </p:style>
+        </p:cxnSp>
+        <p:cxnSp>
+          <p:nvCxnSpPr>
+            <p:cNvPr id="45" name="Straight Connector 44"/>
+            <p:cNvCxnSpPr/>
+            <p:nvPr/>
+          </p:nvCxnSpPr>
+          <p:spPr>
+            <a:xfrm>
+              <a:off x="3706806" y="5805478"/>
+              <a:ext cx="936640" cy="1588"/>
+            </a:xfrm>
+            <a:prstGeom prst="line">
+              <a:avLst/>
+            </a:prstGeom>
+            <a:ln>
+              <a:solidFill>
+                <a:schemeClr val="bg1">
+                  <a:lumMod val="75000"/>
+                </a:schemeClr>
+              </a:solidFill>
+            </a:ln>
+          </p:spPr>
+          <p:style>
+            <a:lnRef idx="1">
+              <a:schemeClr val="accent1"/>
+            </a:lnRef>
+            <a:fillRef idx="0">
+              <a:schemeClr val="accent1"/>
+            </a:fillRef>
+            <a:effectRef idx="0">
+              <a:schemeClr val="accent1"/>
+            </a:effectRef>
+            <a:fontRef idx="minor">
+              <a:schemeClr val="tx1"/>
+            </a:fontRef>
+          </p:style>
+        </p:cxnSp>
+      </p:grpSp>
+      <p:grpSp>
+        <p:nvGrpSpPr>
+          <p:cNvPr id="48" name="Group 47"/>
+          <p:cNvGrpSpPr/>
+          <p:nvPr/>
+        </p:nvGrpSpPr>
+        <p:grpSpPr>
+          <a:xfrm>
+            <a:off x="8001024" y="4189060"/>
+            <a:ext cx="642942" cy="928694"/>
+            <a:chOff x="3635368" y="4538646"/>
+            <a:chExt cx="1071570" cy="1785950"/>
+          </a:xfrm>
+        </p:grpSpPr>
+        <p:sp>
+          <p:nvSpPr>
+            <p:cNvPr id="49" name="Flowchart: Document 48"/>
+            <p:cNvSpPr/>
+            <p:nvPr/>
+          </p:nvSpPr>
+          <p:spPr>
+            <a:xfrm>
+              <a:off x="3635368" y="4538646"/>
+              <a:ext cx="1071570" cy="1785950"/>
+            </a:xfrm>
+            <a:prstGeom prst="flowChartDocument">
+              <a:avLst/>
+            </a:prstGeom>
+          </p:spPr>
+          <p:style>
+            <a:lnRef idx="2">
+              <a:schemeClr val="accent1"/>
+            </a:lnRef>
+            <a:fillRef idx="1">
+              <a:schemeClr val="lt1"/>
+            </a:fillRef>
+            <a:effectRef idx="0">
+              <a:schemeClr val="accent1"/>
+            </a:effectRef>
+            <a:fontRef idx="minor">
+              <a:schemeClr val="dk1"/>
+            </a:fontRef>
+          </p:style>
+          <p:txBody>
+            <a:bodyPr rtlCol="0" anchor="ctr"/>
+            <a:lstStyle/>
+            <a:p>
+              <a:pPr algn="ctr"/>
+              <a:endParaRPr lang="pt-PT"/>
+            </a:p>
+          </p:txBody>
+        </p:sp>
+        <p:cxnSp>
+          <p:nvCxnSpPr>
+            <p:cNvPr id="50" name="Straight Connector 49"/>
+            <p:cNvCxnSpPr/>
+            <p:nvPr/>
+          </p:nvCxnSpPr>
+          <p:spPr>
+            <a:xfrm>
+              <a:off x="3706806" y="4681522"/>
+              <a:ext cx="936640" cy="1588"/>
+            </a:xfrm>
+            <a:prstGeom prst="line">
+              <a:avLst/>
+            </a:prstGeom>
+            <a:ln>
+              <a:solidFill>
+                <a:schemeClr val="bg1">
+                  <a:lumMod val="75000"/>
+                </a:schemeClr>
+              </a:solidFill>
+            </a:ln>
+          </p:spPr>
+          <p:style>
+            <a:lnRef idx="1">
+              <a:schemeClr val="accent1"/>
+            </a:lnRef>
+            <a:fillRef idx="0">
+              <a:schemeClr val="accent1"/>
+            </a:fillRef>
+            <a:effectRef idx="0">
+              <a:schemeClr val="accent1"/>
+            </a:effectRef>
+            <a:fontRef idx="minor">
+              <a:schemeClr val="tx1"/>
+            </a:fontRef>
+          </p:style>
+        </p:cxnSp>
+        <p:cxnSp>
+          <p:nvCxnSpPr>
+            <p:cNvPr id="51" name="Straight Connector 50"/>
+            <p:cNvCxnSpPr/>
+            <p:nvPr/>
+          </p:nvCxnSpPr>
+          <p:spPr>
+            <a:xfrm>
+              <a:off x="3706806" y="4868848"/>
+              <a:ext cx="936640" cy="1588"/>
+            </a:xfrm>
+            <a:prstGeom prst="line">
+              <a:avLst/>
+            </a:prstGeom>
+            <a:ln>
+              <a:solidFill>
+                <a:schemeClr val="bg1">
+                  <a:lumMod val="75000"/>
+                </a:schemeClr>
+              </a:solidFill>
+            </a:ln>
+          </p:spPr>
+          <p:style>
+            <a:lnRef idx="1">
+              <a:schemeClr val="accent1"/>
+            </a:lnRef>
+            <a:fillRef idx="0">
+              <a:schemeClr val="accent1"/>
+            </a:fillRef>
+            <a:effectRef idx="0">
+              <a:schemeClr val="accent1"/>
+            </a:effectRef>
+            <a:fontRef idx="minor">
+              <a:schemeClr val="tx1"/>
+            </a:fontRef>
+          </p:style>
+        </p:cxnSp>
+        <p:cxnSp>
+          <p:nvCxnSpPr>
+            <p:cNvPr id="52" name="Straight Connector 51"/>
+            <p:cNvCxnSpPr/>
+            <p:nvPr/>
+          </p:nvCxnSpPr>
+          <p:spPr>
+            <a:xfrm>
+              <a:off x="3706806" y="5056174"/>
+              <a:ext cx="936640" cy="1588"/>
+            </a:xfrm>
+            <a:prstGeom prst="line">
+              <a:avLst/>
+            </a:prstGeom>
+            <a:ln>
+              <a:solidFill>
+                <a:schemeClr val="bg1">
+                  <a:lumMod val="75000"/>
+                </a:schemeClr>
+              </a:solidFill>
+            </a:ln>
+          </p:spPr>
+          <p:style>
+            <a:lnRef idx="1">
+              <a:schemeClr val="accent1"/>
+            </a:lnRef>
+            <a:fillRef idx="0">
+              <a:schemeClr val="accent1"/>
+            </a:fillRef>
+            <a:effectRef idx="0">
+              <a:schemeClr val="accent1"/>
+            </a:effectRef>
+            <a:fontRef idx="minor">
+              <a:schemeClr val="tx1"/>
+            </a:fontRef>
+          </p:style>
+        </p:cxnSp>
+        <p:cxnSp>
+          <p:nvCxnSpPr>
+            <p:cNvPr id="53" name="Straight Connector 52"/>
+            <p:cNvCxnSpPr/>
+            <p:nvPr/>
+          </p:nvCxnSpPr>
+          <p:spPr>
+            <a:xfrm>
+              <a:off x="3706806" y="5243500"/>
+              <a:ext cx="936640" cy="1588"/>
+            </a:xfrm>
+            <a:prstGeom prst="line">
+              <a:avLst/>
+            </a:prstGeom>
+            <a:ln>
+              <a:solidFill>
+                <a:schemeClr val="bg1">
+                  <a:lumMod val="75000"/>
+                </a:schemeClr>
+              </a:solidFill>
+            </a:ln>
+          </p:spPr>
+          <p:style>
+            <a:lnRef idx="1">
+              <a:schemeClr val="accent1"/>
+            </a:lnRef>
+            <a:fillRef idx="0">
+              <a:schemeClr val="accent1"/>
+            </a:fillRef>
+            <a:effectRef idx="0">
+              <a:schemeClr val="accent1"/>
+            </a:effectRef>
+            <a:fontRef idx="minor">
+              <a:schemeClr val="tx1"/>
+            </a:fontRef>
+          </p:style>
+        </p:cxnSp>
+        <p:cxnSp>
+          <p:nvCxnSpPr>
+            <p:cNvPr id="54" name="Straight Connector 53"/>
+            <p:cNvCxnSpPr/>
+            <p:nvPr/>
+          </p:nvCxnSpPr>
+          <p:spPr>
+            <a:xfrm>
+              <a:off x="3706806" y="5430826"/>
+              <a:ext cx="936640" cy="1588"/>
+            </a:xfrm>
+            <a:prstGeom prst="line">
+              <a:avLst/>
+            </a:prstGeom>
+            <a:ln>
+              <a:solidFill>
+                <a:schemeClr val="bg1">
+                  <a:lumMod val="75000"/>
+                </a:schemeClr>
+              </a:solidFill>
+            </a:ln>
+          </p:spPr>
+          <p:style>
+            <a:lnRef idx="1">
+              <a:schemeClr val="accent1"/>
+            </a:lnRef>
+            <a:fillRef idx="0">
+              <a:schemeClr val="accent1"/>
+            </a:fillRef>
+            <a:effectRef idx="0">
+              <a:schemeClr val="accent1"/>
+            </a:effectRef>
+            <a:fontRef idx="minor">
+              <a:schemeClr val="tx1"/>
+            </a:fontRef>
+          </p:style>
+        </p:cxnSp>
+        <p:cxnSp>
+          <p:nvCxnSpPr>
+            <p:cNvPr id="55" name="Straight Connector 54"/>
+            <p:cNvCxnSpPr/>
+            <p:nvPr/>
+          </p:nvCxnSpPr>
+          <p:spPr>
+            <a:xfrm>
+              <a:off x="3706806" y="5618152"/>
+              <a:ext cx="936640" cy="1588"/>
+            </a:xfrm>
+            <a:prstGeom prst="line">
+              <a:avLst/>
+            </a:prstGeom>
+            <a:ln>
+              <a:solidFill>
+                <a:schemeClr val="bg1">
+                  <a:lumMod val="75000"/>
+                </a:schemeClr>
+              </a:solidFill>
+            </a:ln>
+          </p:spPr>
+          <p:style>
+            <a:lnRef idx="1">
+              <a:schemeClr val="accent1"/>
+            </a:lnRef>
+            <a:fillRef idx="0">
+              <a:schemeClr val="accent1"/>
+            </a:fillRef>
+            <a:effectRef idx="0">
+              <a:schemeClr val="accent1"/>
+            </a:effectRef>
+            <a:fontRef idx="minor">
+              <a:schemeClr val="tx1"/>
+            </a:fontRef>
+          </p:style>
+        </p:cxnSp>
+        <p:cxnSp>
+          <p:nvCxnSpPr>
+            <p:cNvPr id="56" name="Straight Connector 55"/>
+            <p:cNvCxnSpPr/>
+            <p:nvPr/>
+          </p:nvCxnSpPr>
+          <p:spPr>
+            <a:xfrm>
+              <a:off x="3706806" y="5805478"/>
+              <a:ext cx="936640" cy="1588"/>
+            </a:xfrm>
+            <a:prstGeom prst="line">
+              <a:avLst/>
+            </a:prstGeom>
+            <a:ln>
+              <a:solidFill>
+                <a:schemeClr val="bg1">
+                  <a:lumMod val="75000"/>
+                </a:schemeClr>
+              </a:solidFill>
+            </a:ln>
+          </p:spPr>
+          <p:style>
+            <a:lnRef idx="1">
+              <a:schemeClr val="accent1"/>
+            </a:lnRef>
+            <a:fillRef idx="0">
+              <a:schemeClr val="accent1"/>
+            </a:fillRef>
+            <a:effectRef idx="0">
+              <a:schemeClr val="accent1"/>
+            </a:effectRef>
+            <a:fontRef idx="minor">
+              <a:schemeClr val="tx1"/>
+            </a:fontRef>
+          </p:style>
+        </p:cxnSp>
+      </p:grpSp>
+      <p:sp>
+        <p:nvSpPr>
+          <p:cNvPr id="57" name="Flowchart: Magnetic Disk 56"/>
+          <p:cNvSpPr/>
+          <p:nvPr/>
+        </p:nvSpPr>
+        <p:spPr>
+          <a:xfrm>
+            <a:off x="8036743" y="2786058"/>
+            <a:ext cx="571504" cy="785818"/>
+          </a:xfrm>
+          <a:prstGeom prst="flowChartMagneticDisk">
+            <a:avLst/>
+          </a:prstGeom>
+        </p:spPr>
+        <p:style>
+          <a:lnRef idx="2">
+            <a:schemeClr val="accent1"/>
+          </a:lnRef>
+          <a:fillRef idx="1">
+            <a:schemeClr val="lt1"/>
+          </a:fillRef>
+          <a:effectRef idx="0">
+            <a:schemeClr val="accent1"/>
+          </a:effectRef>
+          <a:fontRef idx="minor">
+            <a:schemeClr val="dk1"/>
+          </a:fontRef>
+        </p:style>
+        <p:txBody>
+          <a:bodyPr rtlCol="0" anchor="ctr"/>
+          <a:lstStyle/>
+          <a:p>
+            <a:pPr algn="ctr"/>
+            <a:endParaRPr lang="pt-PT">
+              <a:solidFill>
+                <a:schemeClr val="dk1"/>
+              </a:solidFill>
+            </a:endParaRPr>
+          </a:p>
+        </p:txBody>
+      </p:sp>
+      <p:sp>
+        <p:nvSpPr>
+          <p:cNvPr id="58" name="Right Arrow 57"/>
+          <p:cNvSpPr/>
+          <p:nvPr/>
+        </p:nvSpPr>
+        <p:spPr>
+          <a:xfrm>
+            <a:off x="7312402" y="2928934"/>
+            <a:ext cx="642942" cy="357190"/>
+          </a:xfrm>
+          <a:prstGeom prst="rightArrow">
+            <a:avLst/>
+          </a:prstGeom>
+          <a:ln>
+            <a:noFill/>
+          </a:ln>
+        </p:spPr>
+        <p:style>
+          <a:lnRef idx="1">
+            <a:schemeClr val="dk1"/>
+          </a:lnRef>
+          <a:fillRef idx="2">
+            <a:schemeClr val="dk1"/>
+          </a:fillRef>
+          <a:effectRef idx="1">
+            <a:schemeClr val="dk1"/>
+          </a:effectRef>
+          <a:fontRef idx="minor">
+            <a:schemeClr val="dk1"/>
+          </a:fontRef>
+        </p:style>
+        <p:txBody>
+          <a:bodyPr rtlCol="0" anchor="ctr"/>
+          <a:lstStyle/>
+          <a:p>
+            <a:pPr algn="ctr"/>
+            <a:endParaRPr lang="pt-PT"/>
+          </a:p>
+        </p:txBody>
+      </p:sp>
+      <p:sp>
+        <p:nvSpPr>
+          <p:cNvPr id="59" name="Right Arrow 58"/>
+          <p:cNvSpPr/>
+          <p:nvPr/>
+        </p:nvSpPr>
+        <p:spPr>
+          <a:xfrm>
+            <a:off x="7312402" y="1395935"/>
+            <a:ext cx="642942" cy="357190"/>
+          </a:xfrm>
+          <a:prstGeom prst="rightArrow">
+            <a:avLst/>
+          </a:prstGeom>
+          <a:ln>
+            <a:noFill/>
+          </a:ln>
+        </p:spPr>
+        <p:style>
+          <a:lnRef idx="1">
+            <a:schemeClr val="dk1"/>
+          </a:lnRef>
+          <a:fillRef idx="2">
+            <a:schemeClr val="dk1"/>
+          </a:fillRef>
+          <a:effectRef idx="1">
+            <a:schemeClr val="dk1"/>
+          </a:effectRef>
+          <a:fontRef idx="minor">
+            <a:schemeClr val="dk1"/>
+          </a:fontRef>
+        </p:style>
+        <p:txBody>
+          <a:bodyPr rtlCol="0" anchor="ctr"/>
+          <a:lstStyle/>
+          <a:p>
+            <a:pPr algn="ctr"/>
+            <a:endParaRPr lang="pt-PT"/>
+          </a:p>
+        </p:txBody>
+      </p:sp>
+      <p:sp>
+        <p:nvSpPr>
+          <p:cNvPr id="60" name="Right Arrow 59"/>
+          <p:cNvSpPr/>
+          <p:nvPr/>
+        </p:nvSpPr>
+        <p:spPr>
+          <a:xfrm>
+            <a:off x="7312402" y="4461933"/>
+            <a:ext cx="642942" cy="357190"/>
+          </a:xfrm>
+          <a:prstGeom prst="rightArrow">
+            <a:avLst/>
+          </a:prstGeom>
+          <a:ln>
+            <a:noFill/>
+          </a:ln>
+        </p:spPr>
+        <p:style>
+          <a:lnRef idx="1">
+            <a:schemeClr val="dk1"/>
+          </a:lnRef>
+          <a:fillRef idx="2">
+            <a:schemeClr val="dk1"/>
+          </a:fillRef>
+          <a:effectRef idx="1">
+            <a:schemeClr val="dk1"/>
+          </a:effectRef>
+          <a:fontRef idx="minor">
+            <a:schemeClr val="dk1"/>
+          </a:fontRef>
+        </p:style>
+        <p:txBody>
+          <a:bodyPr rtlCol="0" anchor="ctr"/>
+          <a:lstStyle/>
+          <a:p>
+            <a:pPr algn="ctr"/>
+            <a:endParaRPr lang="pt-PT"/>
+          </a:p>
+        </p:txBody>
+      </p:sp>
     </p:spTree>
   </p:cSld>
   <p:clrMapOvr>

</xml_diff>